<commit_message>
Fix Lecture 1 typos
</commit_message>
<xml_diff>
--- a/Lectures/Lesson 01 - Intro.pptx
+++ b/Lectures/Lesson 01 - Intro.pptx
@@ -251,7 +251,7 @@
           <a:p>
             <a:fld id="{2CD3B9FB-3495-4939-BD76-7F0D9D7D32B7}" type="datetimeFigureOut">
               <a:rPr lang="en-US" smtClean="0"/>
-              <a:t>08-Oct-18</a:t>
+              <a:t>10/9/2018</a:t>
             </a:fld>
             <a:endParaRPr lang="en-US"/>
           </a:p>
@@ -409,7 +409,7 @@
           <a:p>
             <a:fld id="{7DAB874B-A473-4B36-B711-1F4E2AA2CAB3}" type="slidenum">
               <a:rPr lang="en-US" smtClean="0"/>
-              <a:t>‹№›</a:t>
+              <a:t>‹#›</a:t>
             </a:fld>
             <a:endParaRPr lang="en-US"/>
           </a:p>
@@ -1784,6 +1784,13 @@
               </a:rPr>
               <a:t> </a:t>
             </a:r>
+            <a:r>
+              <a:rPr lang="en-US" sz="1200" dirty="0">
+                <a:latin typeface="Courier New" panose="02070309020205020404" pitchFamily="49" charset="0"/>
+                <a:cs typeface="Courier New" panose="02070309020205020404" pitchFamily="49" charset="0"/>
+              </a:rPr>
+              <a:t/>
+            </a:r>
             <a:br>
               <a:rPr lang="en-US" sz="1200" dirty="0">
                 <a:latin typeface="Courier New" panose="02070309020205020404" pitchFamily="49" charset="0"/>
@@ -5518,7 +5525,7 @@
           <a:p>
             <a:fld id="{243CF121-E856-45B2-8C6E-E03D14472C3D}" type="datetime1">
               <a:rPr lang="en-US" smtClean="0"/>
-              <a:t>08-Oct-18</a:t>
+              <a:t>10/9/2018</a:t>
             </a:fld>
             <a:endParaRPr lang="en-US"/>
           </a:p>
@@ -5560,7 +5567,7 @@
           <a:p>
             <a:fld id="{C11E3E32-FD85-4051-B32D-C1D899658A24}" type="slidenum">
               <a:rPr lang="en-US" smtClean="0"/>
-              <a:t>‹№›</a:t>
+              <a:t>‹#›</a:t>
             </a:fld>
             <a:endParaRPr lang="en-US"/>
           </a:p>
@@ -5686,7 +5693,7 @@
           <a:p>
             <a:fld id="{0C153C3D-EFFD-4B00-AF13-AAEE29ABB4F2}" type="datetime1">
               <a:rPr lang="en-US" smtClean="0"/>
-              <a:t>08-Oct-18</a:t>
+              <a:t>10/9/2018</a:t>
             </a:fld>
             <a:endParaRPr lang="en-US"/>
           </a:p>
@@ -5728,7 +5735,7 @@
           <a:p>
             <a:fld id="{C11E3E32-FD85-4051-B32D-C1D899658A24}" type="slidenum">
               <a:rPr lang="en-US" smtClean="0"/>
-              <a:t>‹№›</a:t>
+              <a:t>‹#›</a:t>
             </a:fld>
             <a:endParaRPr lang="en-US"/>
           </a:p>
@@ -5864,7 +5871,7 @@
           <a:p>
             <a:fld id="{0EF8B7CE-7D2E-4D7A-A91C-EDD1ABE38FFD}" type="datetime1">
               <a:rPr lang="en-US" smtClean="0"/>
-              <a:t>08-Oct-18</a:t>
+              <a:t>10/9/2018</a:t>
             </a:fld>
             <a:endParaRPr lang="en-US"/>
           </a:p>
@@ -5906,7 +5913,7 @@
           <a:p>
             <a:fld id="{C11E3E32-FD85-4051-B32D-C1D899658A24}" type="slidenum">
               <a:rPr lang="en-US" smtClean="0"/>
-              <a:t>‹№›</a:t>
+              <a:t>‹#›</a:t>
             </a:fld>
             <a:endParaRPr lang="en-US"/>
           </a:p>
@@ -6032,7 +6039,7 @@
           <a:p>
             <a:fld id="{C5608847-DF7B-479B-85A8-6BEDD927E99B}" type="datetime1">
               <a:rPr lang="en-US" smtClean="0"/>
-              <a:t>08-Oct-18</a:t>
+              <a:t>10/9/2018</a:t>
             </a:fld>
             <a:endParaRPr lang="en-US"/>
           </a:p>
@@ -6074,7 +6081,7 @@
           <a:p>
             <a:fld id="{C11E3E32-FD85-4051-B32D-C1D899658A24}" type="slidenum">
               <a:rPr lang="en-US" smtClean="0"/>
-              <a:t>‹№›</a:t>
+              <a:t>‹#›</a:t>
             </a:fld>
             <a:endParaRPr lang="en-US"/>
           </a:p>
@@ -6277,7 +6284,7 @@
           <a:p>
             <a:fld id="{4FBAEFBA-F849-4B29-90C9-04CA3A99CF6E}" type="datetime1">
               <a:rPr lang="en-US" smtClean="0"/>
-              <a:t>08-Oct-18</a:t>
+              <a:t>10/9/2018</a:t>
             </a:fld>
             <a:endParaRPr lang="en-US"/>
           </a:p>
@@ -6319,7 +6326,7 @@
           <a:p>
             <a:fld id="{C11E3E32-FD85-4051-B32D-C1D899658A24}" type="slidenum">
               <a:rPr lang="en-US" smtClean="0"/>
-              <a:t>‹№›</a:t>
+              <a:t>‹#›</a:t>
             </a:fld>
             <a:endParaRPr lang="en-US"/>
           </a:p>
@@ -6506,7 +6513,7 @@
           <a:p>
             <a:fld id="{41DF16BF-E90E-45B9-936A-18160831A253}" type="datetime1">
               <a:rPr lang="en-US" smtClean="0"/>
-              <a:t>08-Oct-18</a:t>
+              <a:t>10/9/2018</a:t>
             </a:fld>
             <a:endParaRPr lang="en-US"/>
           </a:p>
@@ -6548,7 +6555,7 @@
           <a:p>
             <a:fld id="{C11E3E32-FD85-4051-B32D-C1D899658A24}" type="slidenum">
               <a:rPr lang="en-US" smtClean="0"/>
-              <a:t>‹№›</a:t>
+              <a:t>‹#›</a:t>
             </a:fld>
             <a:endParaRPr lang="en-US"/>
           </a:p>
@@ -6870,7 +6877,7 @@
           <a:p>
             <a:fld id="{4548C257-5A38-4742-B227-5C6D8D22E905}" type="datetime1">
               <a:rPr lang="en-US" smtClean="0"/>
-              <a:t>08-Oct-18</a:t>
+              <a:t>10/9/2018</a:t>
             </a:fld>
             <a:endParaRPr lang="en-US"/>
           </a:p>
@@ -6912,7 +6919,7 @@
           <a:p>
             <a:fld id="{C11E3E32-FD85-4051-B32D-C1D899658A24}" type="slidenum">
               <a:rPr lang="en-US" smtClean="0"/>
-              <a:t>‹№›</a:t>
+              <a:t>‹#›</a:t>
             </a:fld>
             <a:endParaRPr lang="en-US"/>
           </a:p>
@@ -6987,7 +6994,7 @@
           <a:p>
             <a:fld id="{019BA75F-1AAF-47E3-843C-6C1905B0DCAD}" type="datetime1">
               <a:rPr lang="en-US" smtClean="0"/>
-              <a:t>08-Oct-18</a:t>
+              <a:t>10/9/2018</a:t>
             </a:fld>
             <a:endParaRPr lang="en-US"/>
           </a:p>
@@ -7029,7 +7036,7 @@
           <a:p>
             <a:fld id="{C11E3E32-FD85-4051-B32D-C1D899658A24}" type="slidenum">
               <a:rPr lang="en-US" smtClean="0"/>
-              <a:t>‹№›</a:t>
+              <a:t>‹#›</a:t>
             </a:fld>
             <a:endParaRPr lang="en-US"/>
           </a:p>
@@ -7082,7 +7089,7 @@
           <a:p>
             <a:fld id="{8E3BBF73-4445-4E8C-9B2A-7EA5C7405416}" type="datetime1">
               <a:rPr lang="en-US" smtClean="0"/>
-              <a:t>08-Oct-18</a:t>
+              <a:t>10/9/2018</a:t>
             </a:fld>
             <a:endParaRPr lang="en-US"/>
           </a:p>
@@ -7124,7 +7131,7 @@
           <a:p>
             <a:fld id="{C11E3E32-FD85-4051-B32D-C1D899658A24}" type="slidenum">
               <a:rPr lang="en-US" smtClean="0"/>
-              <a:t>‹№›</a:t>
+              <a:t>‹#›</a:t>
             </a:fld>
             <a:endParaRPr lang="en-US"/>
           </a:p>
@@ -7357,7 +7364,7 @@
           <a:p>
             <a:fld id="{9F39D6E4-CED5-4522-AAB4-0BA0869DBDEC}" type="datetime1">
               <a:rPr lang="en-US" smtClean="0"/>
-              <a:t>08-Oct-18</a:t>
+              <a:t>10/9/2018</a:t>
             </a:fld>
             <a:endParaRPr lang="en-US"/>
           </a:p>
@@ -7399,7 +7406,7 @@
           <a:p>
             <a:fld id="{C11E3E32-FD85-4051-B32D-C1D899658A24}" type="slidenum">
               <a:rPr lang="en-US" smtClean="0"/>
-              <a:t>‹№›</a:t>
+              <a:t>‹#›</a:t>
             </a:fld>
             <a:endParaRPr lang="en-US"/>
           </a:p>
@@ -7609,7 +7616,7 @@
           <a:p>
             <a:fld id="{F3ED2022-4C1A-4AA8-B502-9EFA2336A38A}" type="datetime1">
               <a:rPr lang="en-US" smtClean="0"/>
-              <a:t>08-Oct-18</a:t>
+              <a:t>10/9/2018</a:t>
             </a:fld>
             <a:endParaRPr lang="en-US"/>
           </a:p>
@@ -7651,7 +7658,7 @@
           <a:p>
             <a:fld id="{C11E3E32-FD85-4051-B32D-C1D899658A24}" type="slidenum">
               <a:rPr lang="en-US" smtClean="0"/>
-              <a:t>‹№›</a:t>
+              <a:t>‹#›</a:t>
             </a:fld>
             <a:endParaRPr lang="en-US"/>
           </a:p>
@@ -7820,7 +7827,7 @@
           <a:p>
             <a:fld id="{E8F4AD22-7DD9-40FC-9E2C-81F56AB82C00}" type="datetime1">
               <a:rPr lang="en-US" smtClean="0"/>
-              <a:t>08-Oct-18</a:t>
+              <a:t>10/9/2018</a:t>
             </a:fld>
             <a:endParaRPr lang="en-US"/>
           </a:p>
@@ -7898,7 +7905,7 @@
           <a:p>
             <a:fld id="{C11E3E32-FD85-4051-B32D-C1D899658A24}" type="slidenum">
               <a:rPr lang="en-US" smtClean="0"/>
-              <a:t>‹№›</a:t>
+              <a:t>‹#›</a:t>
             </a:fld>
             <a:endParaRPr lang="en-US"/>
           </a:p>
@@ -8505,7 +8512,7 @@
           <a:effectLst/>
           <a:extLst>
             <a:ext uri="{909E8E84-426E-40dd-AFC4-6F175D3DCCD1}">
-              <a14:hiddenFill xmlns:a14="http://schemas.microsoft.com/office/drawing/2010/main" xmlns="">
+              <a14:hiddenFill xmlns="" xmlns:a14="http://schemas.microsoft.com/office/drawing/2010/main">
                 <a:blipFill dpi="0" rotWithShape="0">
                   <a:blip xmlns:r="http://schemas.openxmlformats.org/officeDocument/2006/relationships"/>
                   <a:srcRect/>
@@ -8516,7 +8523,7 @@
               </a14:hiddenFill>
             </a:ext>
             <a:ext uri="{91240B29-F687-4f45-9708-019B960494DF}">
-              <a14:hiddenLine xmlns:a14="http://schemas.microsoft.com/office/drawing/2010/main" xmlns="" w="9525">
+              <a14:hiddenLine xmlns="" xmlns:a14="http://schemas.microsoft.com/office/drawing/2010/main" w="9525">
                 <a:solidFill>
                   <a:srgbClr val="808080"/>
                 </a:solidFill>
@@ -8526,7 +8533,7 @@
               </a14:hiddenLine>
             </a:ext>
             <a:ext uri="{AF507438-7753-43e0-B8FC-AC1667EBCBE1}">
-              <a14:hiddenEffects xmlns:a14="http://schemas.microsoft.com/office/drawing/2010/main" xmlns="">
+              <a14:hiddenEffects xmlns="" xmlns:a14="http://schemas.microsoft.com/office/drawing/2010/main">
                 <a:effectLst>
                   <a:outerShdw blurRad="63500" dist="38099" dir="2700000" algn="ctr" rotWithShape="0">
                     <a:srgbClr val="000000">
@@ -10071,6 +10078,16 @@
               </a:rPr>
               <a:t>/* discriminant */</a:t>
             </a:r>
+            <a:r>
+              <a:rPr lang="uk-UA" altLang="uk-UA" dirty="0">
+                <a:solidFill>
+                  <a:srgbClr val="000000"/>
+                </a:solidFill>
+                <a:latin typeface="Courier New" panose="02070309020205020404" pitchFamily="49" charset="0"/>
+                <a:cs typeface="Courier New" panose="02070309020205020404" pitchFamily="49" charset="0"/>
+              </a:rPr>
+              <a:t/>
+            </a:r>
             <a:br>
               <a:rPr lang="uk-UA" altLang="uk-UA" dirty="0">
                 <a:solidFill>
@@ -10080,6 +10097,16 @@
                 <a:cs typeface="Courier New" panose="02070309020205020404" pitchFamily="49" charset="0"/>
               </a:rPr>
             </a:br>
+            <a:r>
+              <a:rPr lang="uk-UA" altLang="uk-UA" dirty="0">
+                <a:solidFill>
+                  <a:srgbClr val="000000"/>
+                </a:solidFill>
+                <a:latin typeface="Courier New" panose="02070309020205020404" pitchFamily="49" charset="0"/>
+                <a:cs typeface="Courier New" panose="02070309020205020404" pitchFamily="49" charset="0"/>
+              </a:rPr>
+              <a:t/>
+            </a:r>
             <a:br>
               <a:rPr lang="uk-UA" altLang="uk-UA" dirty="0">
                 <a:solidFill>
@@ -11902,30 +11929,6 @@
       </p:sp>
       <p:pic>
         <p:nvPicPr>
-          <p:cNvPr id="3" name="Picture 2"/>
-          <p:cNvPicPr>
-            <a:picLocks noChangeAspect="1"/>
-          </p:cNvPicPr>
-          <p:nvPr/>
-        </p:nvPicPr>
-        <p:blipFill>
-          <a:blip r:embed="rId2"/>
-          <a:stretch>
-            <a:fillRect/>
-          </a:stretch>
-        </p:blipFill>
-        <p:spPr>
-          <a:xfrm>
-            <a:off x="1270142" y="1690688"/>
-            <a:ext cx="9651715" cy="4643437"/>
-          </a:xfrm>
-          <a:prstGeom prst="rect">
-            <a:avLst/>
-          </a:prstGeom>
-        </p:spPr>
-      </p:pic>
-      <p:pic>
-        <p:nvPicPr>
           <p:cNvPr id="4" name="Рисунок 3">
             <a:extLst>
               <a:ext uri="{FF2B5EF4-FFF2-40B4-BE49-F238E27FC236}">
@@ -11939,7 +11942,7 @@
           <p:nvPr/>
         </p:nvPicPr>
         <p:blipFill>
-          <a:blip r:embed="rId3" cstate="print">
+          <a:blip r:embed="rId2" cstate="print">
             <a:extLst>
               <a:ext uri="{28A0092B-C50C-407E-A947-70E740481C1C}">
                 <a14:useLocalDpi xmlns:a14="http://schemas.microsoft.com/office/drawing/2010/main" val="0"/>
@@ -11989,6 +11992,30 @@
           </a:p>
         </p:txBody>
       </p:sp>
+      <p:pic>
+        <p:nvPicPr>
+          <p:cNvPr id="8" name="Picture 7"/>
+          <p:cNvPicPr>
+            <a:picLocks noChangeAspect="1"/>
+          </p:cNvPicPr>
+          <p:nvPr/>
+        </p:nvPicPr>
+        <p:blipFill>
+          <a:blip r:embed="rId3"/>
+          <a:stretch>
+            <a:fillRect/>
+          </a:stretch>
+        </p:blipFill>
+        <p:spPr>
+          <a:xfrm>
+            <a:off x="1314450" y="1690688"/>
+            <a:ext cx="9563100" cy="4648200"/>
+          </a:xfrm>
+          <a:prstGeom prst="rect">
+            <a:avLst/>
+          </a:prstGeom>
+        </p:spPr>
+      </p:pic>
     </p:spTree>
     <p:extLst>
       <p:ext uri="{BB962C8B-B14F-4D97-AF65-F5344CB8AC3E}">
@@ -12729,6 +12756,13 @@
               </a:rPr>
               <a:t>;</a:t>
             </a:r>
+            <a:r>
+              <a:rPr lang="en-US" sz="2000" dirty="0">
+                <a:latin typeface="Courier New" panose="02070309020205020404" pitchFamily="49" charset="0"/>
+                <a:cs typeface="Courier New" panose="02070309020205020404" pitchFamily="49" charset="0"/>
+              </a:rPr>
+              <a:t/>
+            </a:r>
             <a:br>
               <a:rPr lang="en-US" sz="2000" dirty="0">
                 <a:latin typeface="Courier New" panose="02070309020205020404" pitchFamily="49" charset="0"/>
@@ -12993,6 +13027,13 @@
                 <a:cs typeface="Courier New" panose="02070309020205020404" pitchFamily="49" charset="0"/>
               </a:rPr>
               <a:t>;</a:t>
+            </a:r>
+            <a:r>
+              <a:rPr lang="en-US" sz="2000" dirty="0">
+                <a:latin typeface="Courier New" panose="02070309020205020404" pitchFamily="49" charset="0"/>
+                <a:cs typeface="Courier New" panose="02070309020205020404" pitchFamily="49" charset="0"/>
+              </a:rPr>
+              <a:t/>
             </a:r>
             <a:br>
               <a:rPr lang="en-US" sz="2000" dirty="0">
@@ -13884,6 +13925,16 @@
                 <a:spcPct val="0"/>
               </a:spcAft>
             </a:pPr>
+            <a:r>
+              <a:rPr lang="uk-UA" altLang="uk-UA" sz="2800" dirty="0">
+                <a:solidFill>
+                  <a:srgbClr val="000000"/>
+                </a:solidFill>
+                <a:latin typeface="Courier New" panose="02070309020205020404" pitchFamily="49" charset="0"/>
+                <a:cs typeface="Courier New" panose="02070309020205020404" pitchFamily="49" charset="0"/>
+              </a:rPr>
+              <a:t/>
+            </a:r>
             <a:br>
               <a:rPr lang="uk-UA" altLang="uk-UA" sz="2800" dirty="0">
                 <a:solidFill>
@@ -15333,6 +15384,20 @@
                 <a:cs typeface="Courier New" panose="02070309020205020404" pitchFamily="49" charset="0"/>
               </a:rPr>
             </a:br>
+            <a:r>
+              <a:rPr kumimoji="0" lang="uk-UA" altLang="uk-UA" b="0" i="0" u="none" strike="noStrike" cap="none" normalizeH="0" baseline="0" dirty="0">
+                <a:ln>
+                  <a:noFill/>
+                </a:ln>
+                <a:solidFill>
+                  <a:srgbClr val="000000"/>
+                </a:solidFill>
+                <a:effectLst/>
+                <a:latin typeface="Courier New" panose="02070309020205020404" pitchFamily="49" charset="0"/>
+                <a:cs typeface="Courier New" panose="02070309020205020404" pitchFamily="49" charset="0"/>
+              </a:rPr>
+              <a:t/>
+            </a:r>
             <a:br>
               <a:rPr kumimoji="0" lang="uk-UA" altLang="uk-UA" b="0" i="0" u="none" strike="noStrike" cap="none" normalizeH="0" baseline="0" dirty="0">
                 <a:ln>
@@ -15511,6 +15576,20 @@
                 <a:cs typeface="Courier New" panose="02070309020205020404" pitchFamily="49" charset="0"/>
               </a:rPr>
             </a:br>
+            <a:r>
+              <a:rPr kumimoji="0" lang="uk-UA" altLang="uk-UA" b="0" i="0" u="none" strike="noStrike" cap="none" normalizeH="0" baseline="0" dirty="0">
+                <a:ln>
+                  <a:noFill/>
+                </a:ln>
+                <a:solidFill>
+                  <a:srgbClr val="000000"/>
+                </a:solidFill>
+                <a:effectLst/>
+                <a:latin typeface="Courier New" panose="02070309020205020404" pitchFamily="49" charset="0"/>
+                <a:cs typeface="Courier New" panose="02070309020205020404" pitchFamily="49" charset="0"/>
+              </a:rPr>
+              <a:t/>
+            </a:r>
             <a:br>
               <a:rPr kumimoji="0" lang="uk-UA" altLang="uk-UA" b="0" i="0" u="none" strike="noStrike" cap="none" normalizeH="0" baseline="0" dirty="0">
                 <a:ln>
@@ -15689,6 +15768,20 @@
                 <a:cs typeface="Courier New" panose="02070309020205020404" pitchFamily="49" charset="0"/>
               </a:rPr>
             </a:br>
+            <a:r>
+              <a:rPr kumimoji="0" lang="uk-UA" altLang="uk-UA" b="0" i="0" u="none" strike="noStrike" cap="none" normalizeH="0" baseline="0" dirty="0">
+                <a:ln>
+                  <a:noFill/>
+                </a:ln>
+                <a:solidFill>
+                  <a:srgbClr val="000000"/>
+                </a:solidFill>
+                <a:effectLst/>
+                <a:latin typeface="Courier New" panose="02070309020205020404" pitchFamily="49" charset="0"/>
+                <a:cs typeface="Courier New" panose="02070309020205020404" pitchFamily="49" charset="0"/>
+              </a:rPr>
+              <a:t/>
+            </a:r>
             <a:br>
               <a:rPr kumimoji="0" lang="uk-UA" altLang="uk-UA" b="0" i="0" u="none" strike="noStrike" cap="none" normalizeH="0" baseline="0" dirty="0">
                 <a:ln>
@@ -16541,6 +16634,20 @@
                 <a:cs typeface="Courier New" panose="02070309020205020404" pitchFamily="49" charset="0"/>
               </a:rPr>
             </a:br>
+            <a:r>
+              <a:rPr kumimoji="0" lang="uk-UA" altLang="uk-UA" sz="2400" b="0" i="0" u="none" strike="noStrike" cap="none" normalizeH="0" baseline="0" dirty="0">
+                <a:ln>
+                  <a:noFill/>
+                </a:ln>
+                <a:solidFill>
+                  <a:srgbClr val="000000"/>
+                </a:solidFill>
+                <a:effectLst/>
+                <a:latin typeface="Courier New" panose="02070309020205020404" pitchFamily="49" charset="0"/>
+                <a:cs typeface="Courier New" panose="02070309020205020404" pitchFamily="49" charset="0"/>
+              </a:rPr>
+              <a:t/>
+            </a:r>
             <a:br>
               <a:rPr kumimoji="0" lang="uk-UA" altLang="uk-UA" sz="2400" b="0" i="0" u="none" strike="noStrike" cap="none" normalizeH="0" baseline="0" dirty="0">
                 <a:ln>
@@ -16554,6 +16661,20 @@
                 <a:cs typeface="Courier New" panose="02070309020205020404" pitchFamily="49" charset="0"/>
               </a:rPr>
             </a:br>
+            <a:r>
+              <a:rPr kumimoji="0" lang="uk-UA" altLang="uk-UA" sz="2400" b="0" i="0" u="none" strike="noStrike" cap="none" normalizeH="0" baseline="0" dirty="0">
+                <a:ln>
+                  <a:noFill/>
+                </a:ln>
+                <a:solidFill>
+                  <a:srgbClr val="000000"/>
+                </a:solidFill>
+                <a:effectLst/>
+                <a:latin typeface="Courier New" panose="02070309020205020404" pitchFamily="49" charset="0"/>
+                <a:cs typeface="Courier New" panose="02070309020205020404" pitchFamily="49" charset="0"/>
+              </a:rPr>
+              <a:t/>
+            </a:r>
             <a:br>
               <a:rPr kumimoji="0" lang="uk-UA" altLang="uk-UA" sz="2400" b="0" i="0" u="none" strike="noStrike" cap="none" normalizeH="0" baseline="0" dirty="0">
                 <a:ln>
@@ -17334,24 +17455,64 @@
               <a:t>i = </a:t>
             </a:r>
             <a:r>
+              <a:rPr lang="en-US" altLang="uk-UA" dirty="0" smtClean="0">
+                <a:solidFill>
+                  <a:srgbClr val="0000FF"/>
+                </a:solidFill>
+                <a:latin typeface="Courier New" panose="02070309020205020404" pitchFamily="49" charset="0"/>
+                <a:cs typeface="Courier New" panose="02070309020205020404" pitchFamily="49" charset="0"/>
+              </a:rPr>
+              <a:t>1</a:t>
+            </a:r>
+            <a:r>
+              <a:rPr lang="uk-UA" altLang="uk-UA" dirty="0" smtClean="0">
+                <a:solidFill>
+                  <a:srgbClr val="000000"/>
+                </a:solidFill>
+                <a:latin typeface="Courier New" panose="02070309020205020404" pitchFamily="49" charset="0"/>
+                <a:cs typeface="Courier New" panose="02070309020205020404" pitchFamily="49" charset="0"/>
+              </a:rPr>
+              <a:t>; </a:t>
+            </a:r>
+            <a:r>
               <a:rPr lang="uk-UA" altLang="uk-UA" dirty="0">
                 <a:solidFill>
-                  <a:srgbClr val="0000FF"/>
-                </a:solidFill>
-                <a:latin typeface="Courier New" panose="02070309020205020404" pitchFamily="49" charset="0"/>
-                <a:cs typeface="Courier New" panose="02070309020205020404" pitchFamily="49" charset="0"/>
-              </a:rPr>
-              <a:t>0</a:t>
-            </a:r>
-            <a:r>
-              <a:rPr lang="uk-UA" altLang="uk-UA" dirty="0">
-                <a:solidFill>
-                  <a:srgbClr val="000000"/>
-                </a:solidFill>
-                <a:latin typeface="Courier New" panose="02070309020205020404" pitchFamily="49" charset="0"/>
-                <a:cs typeface="Courier New" panose="02070309020205020404" pitchFamily="49" charset="0"/>
-              </a:rPr>
-              <a:t>; i &lt; </a:t>
+                  <a:srgbClr val="000000"/>
+                </a:solidFill>
+                <a:latin typeface="Courier New" panose="02070309020205020404" pitchFamily="49" charset="0"/>
+                <a:cs typeface="Courier New" panose="02070309020205020404" pitchFamily="49" charset="0"/>
+              </a:rPr>
+              <a:t>i </a:t>
+            </a:r>
+            <a:r>
+              <a:rPr lang="uk-UA" altLang="uk-UA" dirty="0" smtClean="0">
+                <a:solidFill>
+                  <a:srgbClr val="000000"/>
+                </a:solidFill>
+                <a:latin typeface="Courier New" panose="02070309020205020404" pitchFamily="49" charset="0"/>
+                <a:cs typeface="Courier New" panose="02070309020205020404" pitchFamily="49" charset="0"/>
+              </a:rPr>
+              <a:t>&lt;</a:t>
+            </a:r>
+            <a:r>
+              <a:rPr lang="en-US" altLang="uk-UA" dirty="0" smtClean="0">
+                <a:solidFill>
+                  <a:srgbClr val="000000"/>
+                </a:solidFill>
+                <a:latin typeface="Courier New" panose="02070309020205020404" pitchFamily="49" charset="0"/>
+                <a:cs typeface="Courier New" panose="02070309020205020404" pitchFamily="49" charset="0"/>
+              </a:rPr>
+              <a:t>=</a:t>
+            </a:r>
+            <a:r>
+              <a:rPr lang="uk-UA" altLang="uk-UA" dirty="0" smtClean="0">
+                <a:solidFill>
+                  <a:srgbClr val="000000"/>
+                </a:solidFill>
+                <a:latin typeface="Courier New" panose="02070309020205020404" pitchFamily="49" charset="0"/>
+                <a:cs typeface="Courier New" panose="02070309020205020404" pitchFamily="49" charset="0"/>
+              </a:rPr>
+              <a:t> </a:t>
             </a:r>
             <a:r>
               <a:rPr lang="uk-UA" altLang="uk-UA" dirty="0">
@@ -17404,6 +17565,18 @@
                 </a:solidFill>
               </a:rPr>
               <a:t>Indexing start from 0</a:t>
+            </a:r>
+            <a:r>
+              <a:rPr lang="uk-UA" altLang="uk-UA" dirty="0">
+                <a:solidFill>
+                  <a:schemeClr val="bg2">
+                    <a:lumMod val="50000"/>
+                  </a:schemeClr>
+                </a:solidFill>
+                <a:latin typeface="Courier New" panose="02070309020205020404" pitchFamily="49" charset="0"/>
+                <a:cs typeface="Courier New" panose="02070309020205020404" pitchFamily="49" charset="0"/>
+              </a:rPr>
+              <a:t/>
             </a:r>
             <a:br>
               <a:rPr lang="uk-UA" altLang="uk-UA" dirty="0">
@@ -17482,6 +17655,16 @@
                 <a:spcPct val="0"/>
               </a:spcAft>
             </a:pPr>
+            <a:r>
+              <a:rPr lang="uk-UA" altLang="uk-UA" dirty="0">
+                <a:solidFill>
+                  <a:srgbClr val="000000"/>
+                </a:solidFill>
+                <a:latin typeface="Courier New" panose="02070309020205020404" pitchFamily="49" charset="0"/>
+                <a:cs typeface="Courier New" panose="02070309020205020404" pitchFamily="49" charset="0"/>
+              </a:rPr>
+              <a:t/>
+            </a:r>
             <a:br>
               <a:rPr lang="uk-UA" altLang="uk-UA" dirty="0">
                 <a:solidFill>
@@ -17652,6 +17835,18 @@
                 </a:solidFill>
               </a:rPr>
               <a:t>Can store multiple values inside</a:t>
+            </a:r>
+            <a:r>
+              <a:rPr lang="uk-UA" altLang="uk-UA" dirty="0">
+                <a:solidFill>
+                  <a:schemeClr val="bg2">
+                    <a:lumMod val="50000"/>
+                  </a:schemeClr>
+                </a:solidFill>
+                <a:latin typeface="Courier New" panose="02070309020205020404" pitchFamily="49" charset="0"/>
+                <a:cs typeface="Courier New" panose="02070309020205020404" pitchFamily="49" charset="0"/>
+              </a:rPr>
+              <a:t/>
             </a:r>
             <a:br>
               <a:rPr lang="uk-UA" altLang="uk-UA" dirty="0">
@@ -17683,6 +17878,16 @@
                 <a:spcPct val="0"/>
               </a:spcAft>
             </a:pPr>
+            <a:r>
+              <a:rPr lang="uk-UA" altLang="uk-UA" dirty="0">
+                <a:solidFill>
+                  <a:srgbClr val="000000"/>
+                </a:solidFill>
+                <a:latin typeface="Courier New" panose="02070309020205020404" pitchFamily="49" charset="0"/>
+                <a:cs typeface="Courier New" panose="02070309020205020404" pitchFamily="49" charset="0"/>
+              </a:rPr>
+              <a:t/>
+            </a:r>
             <a:br>
               <a:rPr lang="uk-UA" altLang="uk-UA" dirty="0">
                 <a:solidFill>
@@ -17827,6 +18032,16 @@
                 <a:spcPct val="0"/>
               </a:spcAft>
             </a:pPr>
+            <a:r>
+              <a:rPr lang="uk-UA" altLang="uk-UA" dirty="0">
+                <a:solidFill>
+                  <a:srgbClr val="000000"/>
+                </a:solidFill>
+                <a:latin typeface="Courier New" panose="02070309020205020404" pitchFamily="49" charset="0"/>
+                <a:cs typeface="Courier New" panose="02070309020205020404" pitchFamily="49" charset="0"/>
+              </a:rPr>
+              <a:t/>
+            </a:r>
             <a:br>
               <a:rPr lang="uk-UA" altLang="uk-UA" dirty="0">
                 <a:solidFill>
@@ -23686,6 +23901,16 @@
               </a:rPr>
               <a:t>statement;</a:t>
             </a:r>
+            <a:r>
+              <a:rPr lang="uk-UA" altLang="uk-UA" sz="2400" dirty="0">
+                <a:solidFill>
+                  <a:srgbClr val="000000"/>
+                </a:solidFill>
+                <a:latin typeface="Courier New" panose="02070309020205020404" pitchFamily="49" charset="0"/>
+                <a:cs typeface="Courier New" panose="02070309020205020404" pitchFamily="49" charset="0"/>
+              </a:rPr>
+              <a:t/>
+            </a:r>
             <a:br>
               <a:rPr lang="uk-UA" altLang="uk-UA" sz="2400" dirty="0">
                 <a:solidFill>
@@ -24435,6 +24660,16 @@
               </a:rPr>
               <a:t>statement;</a:t>
             </a:r>
+            <a:r>
+              <a:rPr lang="uk-UA" altLang="uk-UA" sz="2400" dirty="0">
+                <a:solidFill>
+                  <a:srgbClr val="000000"/>
+                </a:solidFill>
+                <a:latin typeface="Courier New" panose="02070309020205020404" pitchFamily="49" charset="0"/>
+                <a:cs typeface="Courier New" panose="02070309020205020404" pitchFamily="49" charset="0"/>
+              </a:rPr>
+              <a:t/>
+            </a:r>
             <a:br>
               <a:rPr lang="uk-UA" altLang="uk-UA" sz="2400" dirty="0">
                 <a:solidFill>
@@ -25519,6 +25754,16 @@
                 <a:cs typeface="Courier New" panose="02070309020205020404" pitchFamily="49" charset="0"/>
               </a:rPr>
             </a:br>
+            <a:r>
+              <a:rPr lang="uk-UA" altLang="uk-UA" sz="2400" i="1" dirty="0">
+                <a:solidFill>
+                  <a:srgbClr val="808080"/>
+                </a:solidFill>
+                <a:latin typeface="Courier New" panose="02070309020205020404" pitchFamily="49" charset="0"/>
+                <a:cs typeface="Courier New" panose="02070309020205020404" pitchFamily="49" charset="0"/>
+              </a:rPr>
+              <a:t/>
+            </a:r>
             <a:br>
               <a:rPr lang="uk-UA" altLang="uk-UA" sz="2400" i="1" dirty="0">
                 <a:solidFill>
@@ -25676,6 +25921,16 @@
                 <a:cs typeface="Courier New" panose="02070309020205020404" pitchFamily="49" charset="0"/>
               </a:rPr>
               <a:t>{</a:t>
+            </a:r>
+            <a:r>
+              <a:rPr lang="uk-UA" altLang="uk-UA" sz="2400" dirty="0">
+                <a:solidFill>
+                  <a:srgbClr val="000000"/>
+                </a:solidFill>
+                <a:latin typeface="Courier New" panose="02070309020205020404" pitchFamily="49" charset="0"/>
+                <a:cs typeface="Courier New" panose="02070309020205020404" pitchFamily="49" charset="0"/>
+              </a:rPr>
+              <a:t/>
             </a:r>
             <a:br>
               <a:rPr lang="uk-UA" altLang="uk-UA" sz="2400" dirty="0">
@@ -25793,6 +26048,16 @@
               </a:rPr>
               <a:t>	}</a:t>
             </a:r>
+            <a:r>
+              <a:rPr lang="uk-UA" altLang="uk-UA" sz="2400" dirty="0">
+                <a:solidFill>
+                  <a:srgbClr val="000000"/>
+                </a:solidFill>
+                <a:latin typeface="Courier New" panose="02070309020205020404" pitchFamily="49" charset="0"/>
+                <a:cs typeface="Courier New" panose="02070309020205020404" pitchFamily="49" charset="0"/>
+              </a:rPr>
+              <a:t/>
+            </a:r>
             <a:br>
               <a:rPr lang="uk-UA" altLang="uk-UA" sz="2400" dirty="0">
                 <a:solidFill>
@@ -25881,6 +26146,16 @@
                 <a:cs typeface="Courier New" panose="02070309020205020404" pitchFamily="49" charset="0"/>
               </a:rPr>
               <a:t>;</a:t>
+            </a:r>
+            <a:r>
+              <a:rPr lang="uk-UA" altLang="uk-UA" sz="2400" i="1" dirty="0">
+                <a:solidFill>
+                  <a:srgbClr val="808080"/>
+                </a:solidFill>
+                <a:latin typeface="Courier New" panose="02070309020205020404" pitchFamily="49" charset="0"/>
+                <a:cs typeface="Courier New" panose="02070309020205020404" pitchFamily="49" charset="0"/>
+              </a:rPr>
+              <a:t/>
             </a:r>
             <a:br>
               <a:rPr lang="uk-UA" altLang="uk-UA" sz="2400" i="1" dirty="0">
@@ -26521,6 +26796,16 @@
               </a:rPr>
               <a:t>	}</a:t>
             </a:r>
+            <a:r>
+              <a:rPr lang="uk-UA" altLang="uk-UA" sz="2400" dirty="0">
+                <a:solidFill>
+                  <a:srgbClr val="000000"/>
+                </a:solidFill>
+                <a:latin typeface="Courier New" panose="02070309020205020404" pitchFamily="49" charset="0"/>
+                <a:cs typeface="Courier New" panose="02070309020205020404" pitchFamily="49" charset="0"/>
+              </a:rPr>
+              <a:t/>
+            </a:r>
             <a:br>
               <a:rPr lang="uk-UA" altLang="uk-UA" sz="2400" dirty="0">
                 <a:solidFill>
@@ -26559,6 +26844,16 @@
                 <a:cs typeface="Courier New" panose="02070309020205020404" pitchFamily="49" charset="0"/>
               </a:rPr>
               <a:t>();</a:t>
+            </a:r>
+            <a:r>
+              <a:rPr lang="uk-UA" altLang="uk-UA" sz="2400" i="1" dirty="0">
+                <a:solidFill>
+                  <a:srgbClr val="808080"/>
+                </a:solidFill>
+                <a:latin typeface="Courier New" panose="02070309020205020404" pitchFamily="49" charset="0"/>
+                <a:cs typeface="Courier New" panose="02070309020205020404" pitchFamily="49" charset="0"/>
+              </a:rPr>
+              <a:t/>
             </a:r>
             <a:br>
               <a:rPr lang="uk-UA" altLang="uk-UA" sz="2400" i="1" dirty="0">
@@ -27252,6 +27547,16 @@
               </a:rPr>
               <a:t> {</a:t>
             </a:r>
+            <a:r>
+              <a:rPr lang="uk-UA" altLang="uk-UA" sz="2400" dirty="0">
+                <a:solidFill>
+                  <a:srgbClr val="000000"/>
+                </a:solidFill>
+                <a:latin typeface="Courier New" panose="02070309020205020404" pitchFamily="49" charset="0"/>
+                <a:cs typeface="Courier New" panose="02070309020205020404" pitchFamily="49" charset="0"/>
+              </a:rPr>
+              <a:t/>
+            </a:r>
             <a:br>
               <a:rPr lang="uk-UA" altLang="uk-UA" sz="2400" dirty="0">
                 <a:solidFill>
@@ -27358,6 +27663,16 @@
               </a:rPr>
               <a:t> and exit from method</a:t>
             </a:r>
+            <a:r>
+              <a:rPr lang="uk-UA" altLang="uk-UA" sz="2400" i="1" dirty="0">
+                <a:solidFill>
+                  <a:srgbClr val="808080"/>
+                </a:solidFill>
+                <a:latin typeface="Courier New" panose="02070309020205020404" pitchFamily="49" charset="0"/>
+                <a:cs typeface="Courier New" panose="02070309020205020404" pitchFamily="49" charset="0"/>
+              </a:rPr>
+              <a:t/>
+            </a:r>
             <a:br>
               <a:rPr lang="uk-UA" altLang="uk-UA" sz="2400" i="1" dirty="0">
                 <a:solidFill>
@@ -27386,6 +27701,10 @@
                 <a:cs typeface="Courier New" panose="02070309020205020404" pitchFamily="49" charset="0"/>
               </a:rPr>
               <a:t>}</a:t>
+            </a:r>
+            <a:r>
+              <a:rPr lang="uk-UA" altLang="uk-UA" dirty="0"/>
+              <a:t/>
             </a:r>
             <a:br>
               <a:rPr lang="uk-UA" altLang="uk-UA" dirty="0"/>
@@ -27429,6 +27748,16 @@
                 <a:cs typeface="Courier New" panose="02070309020205020404" pitchFamily="49" charset="0"/>
               </a:rPr>
               <a:t>();</a:t>
+            </a:r>
+            <a:r>
+              <a:rPr lang="uk-UA" altLang="uk-UA" sz="2400" i="1" dirty="0">
+                <a:solidFill>
+                  <a:srgbClr val="808080"/>
+                </a:solidFill>
+                <a:latin typeface="Courier New" panose="02070309020205020404" pitchFamily="49" charset="0"/>
+                <a:cs typeface="Courier New" panose="02070309020205020404" pitchFamily="49" charset="0"/>
+              </a:rPr>
+              <a:t/>
             </a:r>
             <a:br>
               <a:rPr lang="uk-UA" altLang="uk-UA" sz="2400" i="1" dirty="0">
@@ -29108,6 +29437,16 @@
                 <a:cs typeface="Courier New" panose="02070309020205020404" pitchFamily="49" charset="0"/>
               </a:rPr>
             </a:br>
+            <a:r>
+              <a:rPr lang="uk-UA" altLang="uk-UA" sz="2400" dirty="0">
+                <a:solidFill>
+                  <a:srgbClr val="000000"/>
+                </a:solidFill>
+                <a:latin typeface="Courier New" panose="02070309020205020404" pitchFamily="49" charset="0"/>
+                <a:cs typeface="Courier New" panose="02070309020205020404" pitchFamily="49" charset="0"/>
+              </a:rPr>
+              <a:t/>
+            </a:r>
             <a:br>
               <a:rPr lang="uk-UA" altLang="uk-UA" sz="2400" dirty="0">
                 <a:solidFill>
@@ -29117,6 +29456,16 @@
                 <a:cs typeface="Courier New" panose="02070309020205020404" pitchFamily="49" charset="0"/>
               </a:rPr>
             </a:br>
+            <a:r>
+              <a:rPr lang="uk-UA" altLang="uk-UA" sz="2400" dirty="0">
+                <a:solidFill>
+                  <a:srgbClr val="000000"/>
+                </a:solidFill>
+                <a:latin typeface="Courier New" panose="02070309020205020404" pitchFamily="49" charset="0"/>
+                <a:cs typeface="Courier New" panose="02070309020205020404" pitchFamily="49" charset="0"/>
+              </a:rPr>
+              <a:t/>
+            </a:r>
             <a:br>
               <a:rPr lang="uk-UA" altLang="uk-UA" sz="2400" dirty="0">
                 <a:solidFill>
@@ -29636,6 +29985,13 @@
               </a:rPr>
               <a:t>;</a:t>
             </a:r>
+            <a:r>
+              <a:rPr lang="en-US" sz="2400" dirty="0">
+                <a:latin typeface="+mn-ea"/>
+                <a:cs typeface="+mn-ea"/>
+              </a:rPr>
+              <a:t/>
+            </a:r>
             <a:br>
               <a:rPr lang="en-US" sz="2400" dirty="0">
                 <a:latin typeface="+mn-ea"/>
@@ -29681,6 +30037,13 @@
               </a:spcAft>
               <a:buNone/>
             </a:pPr>
+            <a:r>
+              <a:rPr lang="en-US" sz="2400" dirty="0">
+                <a:latin typeface="+mn-ea"/>
+                <a:cs typeface="+mn-ea"/>
+              </a:rPr>
+              <a:t/>
+            </a:r>
             <a:br>
               <a:rPr lang="en-US" sz="2400" dirty="0">
                 <a:latin typeface="+mn-ea"/>
@@ -29727,6 +30090,13 @@
               </a:rPr>
               <a:t> {</a:t>
             </a:r>
+            <a:r>
+              <a:rPr lang="en-US" sz="2400" dirty="0">
+                <a:latin typeface="+mn-ea"/>
+                <a:cs typeface="+mn-ea"/>
+              </a:rPr>
+              <a:t/>
+            </a:r>
             <a:br>
               <a:rPr lang="en-US" sz="2400" dirty="0">
                 <a:latin typeface="+mn-ea"/>
@@ -29753,6 +30123,13 @@
               </a:rPr>
               <a:t>// ...</a:t>
             </a:r>
+            <a:r>
+              <a:rPr lang="en-US" sz="2400" dirty="0">
+                <a:latin typeface="+mn-ea"/>
+                <a:cs typeface="+mn-ea"/>
+              </a:rPr>
+              <a:t/>
+            </a:r>
             <a:br>
               <a:rPr lang="en-US" sz="2400" dirty="0">
                 <a:latin typeface="+mn-ea"/>
@@ -29768,6 +30145,13 @@
                 <a:cs typeface="Courier New" panose="02070309020205020404" pitchFamily="49" charset="0"/>
               </a:rPr>
               <a:t>}</a:t>
+            </a:r>
+            <a:r>
+              <a:rPr lang="en-US" sz="2400" dirty="0">
+                <a:latin typeface="+mn-ea"/>
+                <a:cs typeface="+mn-ea"/>
+              </a:rPr>
+              <a:t/>
             </a:r>
             <a:br>
               <a:rPr lang="en-US" sz="2400" dirty="0">
@@ -32490,7 +32874,7 @@
         </p:nvSpPr>
         <p:spPr>
           <a:xfrm>
-            <a:off x="838200" y="4681590"/>
+            <a:off x="838200" y="4788257"/>
             <a:ext cx="7524750" cy="1815882"/>
           </a:xfrm>
           <a:prstGeom prst="rect">
@@ -32535,8 +32919,25 @@
           <a:p>
             <a:r>
               <a:rPr lang="en-US" sz="1400" b="1" dirty="0"/>
-              <a:t>cell[0,0] has integer root: 1</a:t>
-            </a:r>
+              <a:t>cell[0,0] </a:t>
+            </a:r>
+            <a:r>
+              <a:rPr lang="en-US" sz="1400" b="1" dirty="0"/>
+              <a:t>has value </a:t>
+            </a:r>
+            <a:r>
+              <a:rPr lang="en-US" sz="1400" b="1" dirty="0" smtClean="0"/>
+              <a:t>1, </a:t>
+            </a:r>
+            <a:r>
+              <a:rPr lang="en-US" sz="1400" b="1" dirty="0"/>
+              <a:t>it’s root: </a:t>
+            </a:r>
+            <a:r>
+              <a:rPr lang="en-US" sz="1400" b="1" dirty="0" smtClean="0"/>
+              <a:t>1</a:t>
+            </a:r>
+            <a:endParaRPr lang="en-US" sz="1400" b="1" dirty="0"/>
           </a:p>
           <a:p>
             <a:r>
@@ -32586,7 +32987,7 @@
         </p:blipFill>
         <p:spPr>
           <a:xfrm>
-            <a:off x="4643693" y="5055180"/>
+            <a:off x="4643693" y="5256875"/>
             <a:ext cx="1452307" cy="1282037"/>
           </a:xfrm>
           <a:prstGeom prst="rect">

</xml_diff>

<commit_message>
Restrict usage of collections framework
</commit_message>
<xml_diff>
--- a/Lectures/Lesson 01 - Intro.pptx
+++ b/Lectures/Lesson 01 - Intro.pptx
@@ -251,7 +251,7 @@
           <a:p>
             <a:fld id="{2CD3B9FB-3495-4939-BD76-7F0D9D7D32B7}" type="datetimeFigureOut">
               <a:rPr lang="en-US" smtClean="0"/>
-              <a:t>10/9/2018</a:t>
+              <a:t>09-Oct-18</a:t>
             </a:fld>
             <a:endParaRPr lang="en-US"/>
           </a:p>
@@ -409,7 +409,7 @@
           <a:p>
             <a:fld id="{7DAB874B-A473-4B36-B711-1F4E2AA2CAB3}" type="slidenum">
               <a:rPr lang="en-US" smtClean="0"/>
-              <a:t>‹#›</a:t>
+              <a:t>‹№›</a:t>
             </a:fld>
             <a:endParaRPr lang="en-US"/>
           </a:p>
@@ -1784,13 +1784,6 @@
               </a:rPr>
               <a:t> </a:t>
             </a:r>
-            <a:r>
-              <a:rPr lang="en-US" sz="1200" dirty="0">
-                <a:latin typeface="Courier New" panose="02070309020205020404" pitchFamily="49" charset="0"/>
-                <a:cs typeface="Courier New" panose="02070309020205020404" pitchFamily="49" charset="0"/>
-              </a:rPr>
-              <a:t/>
-            </a:r>
             <a:br>
               <a:rPr lang="en-US" sz="1200" dirty="0">
                 <a:latin typeface="Courier New" panose="02070309020205020404" pitchFamily="49" charset="0"/>
@@ -5525,7 +5518,7 @@
           <a:p>
             <a:fld id="{243CF121-E856-45B2-8C6E-E03D14472C3D}" type="datetime1">
               <a:rPr lang="en-US" smtClean="0"/>
-              <a:t>10/9/2018</a:t>
+              <a:t>09-Oct-18</a:t>
             </a:fld>
             <a:endParaRPr lang="en-US"/>
           </a:p>
@@ -5567,7 +5560,7 @@
           <a:p>
             <a:fld id="{C11E3E32-FD85-4051-B32D-C1D899658A24}" type="slidenum">
               <a:rPr lang="en-US" smtClean="0"/>
-              <a:t>‹#›</a:t>
+              <a:t>‹№›</a:t>
             </a:fld>
             <a:endParaRPr lang="en-US"/>
           </a:p>
@@ -5693,7 +5686,7 @@
           <a:p>
             <a:fld id="{0C153C3D-EFFD-4B00-AF13-AAEE29ABB4F2}" type="datetime1">
               <a:rPr lang="en-US" smtClean="0"/>
-              <a:t>10/9/2018</a:t>
+              <a:t>09-Oct-18</a:t>
             </a:fld>
             <a:endParaRPr lang="en-US"/>
           </a:p>
@@ -5735,7 +5728,7 @@
           <a:p>
             <a:fld id="{C11E3E32-FD85-4051-B32D-C1D899658A24}" type="slidenum">
               <a:rPr lang="en-US" smtClean="0"/>
-              <a:t>‹#›</a:t>
+              <a:t>‹№›</a:t>
             </a:fld>
             <a:endParaRPr lang="en-US"/>
           </a:p>
@@ -5871,7 +5864,7 @@
           <a:p>
             <a:fld id="{0EF8B7CE-7D2E-4D7A-A91C-EDD1ABE38FFD}" type="datetime1">
               <a:rPr lang="en-US" smtClean="0"/>
-              <a:t>10/9/2018</a:t>
+              <a:t>09-Oct-18</a:t>
             </a:fld>
             <a:endParaRPr lang="en-US"/>
           </a:p>
@@ -5913,7 +5906,7 @@
           <a:p>
             <a:fld id="{C11E3E32-FD85-4051-B32D-C1D899658A24}" type="slidenum">
               <a:rPr lang="en-US" smtClean="0"/>
-              <a:t>‹#›</a:t>
+              <a:t>‹№›</a:t>
             </a:fld>
             <a:endParaRPr lang="en-US"/>
           </a:p>
@@ -6039,7 +6032,7 @@
           <a:p>
             <a:fld id="{C5608847-DF7B-479B-85A8-6BEDD927E99B}" type="datetime1">
               <a:rPr lang="en-US" smtClean="0"/>
-              <a:t>10/9/2018</a:t>
+              <a:t>09-Oct-18</a:t>
             </a:fld>
             <a:endParaRPr lang="en-US"/>
           </a:p>
@@ -6081,7 +6074,7 @@
           <a:p>
             <a:fld id="{C11E3E32-FD85-4051-B32D-C1D899658A24}" type="slidenum">
               <a:rPr lang="en-US" smtClean="0"/>
-              <a:t>‹#›</a:t>
+              <a:t>‹№›</a:t>
             </a:fld>
             <a:endParaRPr lang="en-US"/>
           </a:p>
@@ -6284,7 +6277,7 @@
           <a:p>
             <a:fld id="{4FBAEFBA-F849-4B29-90C9-04CA3A99CF6E}" type="datetime1">
               <a:rPr lang="en-US" smtClean="0"/>
-              <a:t>10/9/2018</a:t>
+              <a:t>09-Oct-18</a:t>
             </a:fld>
             <a:endParaRPr lang="en-US"/>
           </a:p>
@@ -6326,7 +6319,7 @@
           <a:p>
             <a:fld id="{C11E3E32-FD85-4051-B32D-C1D899658A24}" type="slidenum">
               <a:rPr lang="en-US" smtClean="0"/>
-              <a:t>‹#›</a:t>
+              <a:t>‹№›</a:t>
             </a:fld>
             <a:endParaRPr lang="en-US"/>
           </a:p>
@@ -6513,7 +6506,7 @@
           <a:p>
             <a:fld id="{41DF16BF-E90E-45B9-936A-18160831A253}" type="datetime1">
               <a:rPr lang="en-US" smtClean="0"/>
-              <a:t>10/9/2018</a:t>
+              <a:t>09-Oct-18</a:t>
             </a:fld>
             <a:endParaRPr lang="en-US"/>
           </a:p>
@@ -6555,7 +6548,7 @@
           <a:p>
             <a:fld id="{C11E3E32-FD85-4051-B32D-C1D899658A24}" type="slidenum">
               <a:rPr lang="en-US" smtClean="0"/>
-              <a:t>‹#›</a:t>
+              <a:t>‹№›</a:t>
             </a:fld>
             <a:endParaRPr lang="en-US"/>
           </a:p>
@@ -6877,7 +6870,7 @@
           <a:p>
             <a:fld id="{4548C257-5A38-4742-B227-5C6D8D22E905}" type="datetime1">
               <a:rPr lang="en-US" smtClean="0"/>
-              <a:t>10/9/2018</a:t>
+              <a:t>09-Oct-18</a:t>
             </a:fld>
             <a:endParaRPr lang="en-US"/>
           </a:p>
@@ -6919,7 +6912,7 @@
           <a:p>
             <a:fld id="{C11E3E32-FD85-4051-B32D-C1D899658A24}" type="slidenum">
               <a:rPr lang="en-US" smtClean="0"/>
-              <a:t>‹#›</a:t>
+              <a:t>‹№›</a:t>
             </a:fld>
             <a:endParaRPr lang="en-US"/>
           </a:p>
@@ -6994,7 +6987,7 @@
           <a:p>
             <a:fld id="{019BA75F-1AAF-47E3-843C-6C1905B0DCAD}" type="datetime1">
               <a:rPr lang="en-US" smtClean="0"/>
-              <a:t>10/9/2018</a:t>
+              <a:t>09-Oct-18</a:t>
             </a:fld>
             <a:endParaRPr lang="en-US"/>
           </a:p>
@@ -7036,7 +7029,7 @@
           <a:p>
             <a:fld id="{C11E3E32-FD85-4051-B32D-C1D899658A24}" type="slidenum">
               <a:rPr lang="en-US" smtClean="0"/>
-              <a:t>‹#›</a:t>
+              <a:t>‹№›</a:t>
             </a:fld>
             <a:endParaRPr lang="en-US"/>
           </a:p>
@@ -7089,7 +7082,7 @@
           <a:p>
             <a:fld id="{8E3BBF73-4445-4E8C-9B2A-7EA5C7405416}" type="datetime1">
               <a:rPr lang="en-US" smtClean="0"/>
-              <a:t>10/9/2018</a:t>
+              <a:t>09-Oct-18</a:t>
             </a:fld>
             <a:endParaRPr lang="en-US"/>
           </a:p>
@@ -7131,7 +7124,7 @@
           <a:p>
             <a:fld id="{C11E3E32-FD85-4051-B32D-C1D899658A24}" type="slidenum">
               <a:rPr lang="en-US" smtClean="0"/>
-              <a:t>‹#›</a:t>
+              <a:t>‹№›</a:t>
             </a:fld>
             <a:endParaRPr lang="en-US"/>
           </a:p>
@@ -7364,7 +7357,7 @@
           <a:p>
             <a:fld id="{9F39D6E4-CED5-4522-AAB4-0BA0869DBDEC}" type="datetime1">
               <a:rPr lang="en-US" smtClean="0"/>
-              <a:t>10/9/2018</a:t>
+              <a:t>09-Oct-18</a:t>
             </a:fld>
             <a:endParaRPr lang="en-US"/>
           </a:p>
@@ -7406,7 +7399,7 @@
           <a:p>
             <a:fld id="{C11E3E32-FD85-4051-B32D-C1D899658A24}" type="slidenum">
               <a:rPr lang="en-US" smtClean="0"/>
-              <a:t>‹#›</a:t>
+              <a:t>‹№›</a:t>
             </a:fld>
             <a:endParaRPr lang="en-US"/>
           </a:p>
@@ -7616,7 +7609,7 @@
           <a:p>
             <a:fld id="{F3ED2022-4C1A-4AA8-B502-9EFA2336A38A}" type="datetime1">
               <a:rPr lang="en-US" smtClean="0"/>
-              <a:t>10/9/2018</a:t>
+              <a:t>09-Oct-18</a:t>
             </a:fld>
             <a:endParaRPr lang="en-US"/>
           </a:p>
@@ -7658,7 +7651,7 @@
           <a:p>
             <a:fld id="{C11E3E32-FD85-4051-B32D-C1D899658A24}" type="slidenum">
               <a:rPr lang="en-US" smtClean="0"/>
-              <a:t>‹#›</a:t>
+              <a:t>‹№›</a:t>
             </a:fld>
             <a:endParaRPr lang="en-US"/>
           </a:p>
@@ -7827,7 +7820,7 @@
           <a:p>
             <a:fld id="{E8F4AD22-7DD9-40FC-9E2C-81F56AB82C00}" type="datetime1">
               <a:rPr lang="en-US" smtClean="0"/>
-              <a:t>10/9/2018</a:t>
+              <a:t>09-Oct-18</a:t>
             </a:fld>
             <a:endParaRPr lang="en-US"/>
           </a:p>
@@ -7905,7 +7898,7 @@
           <a:p>
             <a:fld id="{C11E3E32-FD85-4051-B32D-C1D899658A24}" type="slidenum">
               <a:rPr lang="en-US" smtClean="0"/>
-              <a:t>‹#›</a:t>
+              <a:t>‹№›</a:t>
             </a:fld>
             <a:endParaRPr lang="en-US"/>
           </a:p>
@@ -8512,7 +8505,7 @@
           <a:effectLst/>
           <a:extLst>
             <a:ext uri="{909E8E84-426E-40dd-AFC4-6F175D3DCCD1}">
-              <a14:hiddenFill xmlns="" xmlns:a14="http://schemas.microsoft.com/office/drawing/2010/main">
+              <a14:hiddenFill xmlns:a14="http://schemas.microsoft.com/office/drawing/2010/main" xmlns="">
                 <a:blipFill dpi="0" rotWithShape="0">
                   <a:blip xmlns:r="http://schemas.openxmlformats.org/officeDocument/2006/relationships"/>
                   <a:srcRect/>
@@ -8523,7 +8516,7 @@
               </a14:hiddenFill>
             </a:ext>
             <a:ext uri="{91240B29-F687-4f45-9708-019B960494DF}">
-              <a14:hiddenLine xmlns="" xmlns:a14="http://schemas.microsoft.com/office/drawing/2010/main" w="9525">
+              <a14:hiddenLine xmlns:a14="http://schemas.microsoft.com/office/drawing/2010/main" xmlns="" w="9525">
                 <a:solidFill>
                   <a:srgbClr val="808080"/>
                 </a:solidFill>
@@ -8533,7 +8526,7 @@
               </a14:hiddenLine>
             </a:ext>
             <a:ext uri="{AF507438-7753-43e0-B8FC-AC1667EBCBE1}">
-              <a14:hiddenEffects xmlns="" xmlns:a14="http://schemas.microsoft.com/office/drawing/2010/main">
+              <a14:hiddenEffects xmlns:a14="http://schemas.microsoft.com/office/drawing/2010/main" xmlns="">
                 <a:effectLst>
                   <a:outerShdw blurRad="63500" dist="38099" dir="2700000" algn="ctr" rotWithShape="0">
                     <a:srgbClr val="000000">
@@ -10078,16 +10071,6 @@
               </a:rPr>
               <a:t>/* discriminant */</a:t>
             </a:r>
-            <a:r>
-              <a:rPr lang="uk-UA" altLang="uk-UA" dirty="0">
-                <a:solidFill>
-                  <a:srgbClr val="000000"/>
-                </a:solidFill>
-                <a:latin typeface="Courier New" panose="02070309020205020404" pitchFamily="49" charset="0"/>
-                <a:cs typeface="Courier New" panose="02070309020205020404" pitchFamily="49" charset="0"/>
-              </a:rPr>
-              <a:t/>
-            </a:r>
             <a:br>
               <a:rPr lang="uk-UA" altLang="uk-UA" dirty="0">
                 <a:solidFill>
@@ -10097,16 +10080,6 @@
                 <a:cs typeface="Courier New" panose="02070309020205020404" pitchFamily="49" charset="0"/>
               </a:rPr>
             </a:br>
-            <a:r>
-              <a:rPr lang="uk-UA" altLang="uk-UA" dirty="0">
-                <a:solidFill>
-                  <a:srgbClr val="000000"/>
-                </a:solidFill>
-                <a:latin typeface="Courier New" panose="02070309020205020404" pitchFamily="49" charset="0"/>
-                <a:cs typeface="Courier New" panose="02070309020205020404" pitchFamily="49" charset="0"/>
-              </a:rPr>
-              <a:t/>
-            </a:r>
             <a:br>
               <a:rPr lang="uk-UA" altLang="uk-UA" dirty="0">
                 <a:solidFill>
@@ -12756,13 +12729,6 @@
               </a:rPr>
               <a:t>;</a:t>
             </a:r>
-            <a:r>
-              <a:rPr lang="en-US" sz="2000" dirty="0">
-                <a:latin typeface="Courier New" panose="02070309020205020404" pitchFamily="49" charset="0"/>
-                <a:cs typeface="Courier New" panose="02070309020205020404" pitchFamily="49" charset="0"/>
-              </a:rPr>
-              <a:t/>
-            </a:r>
             <a:br>
               <a:rPr lang="en-US" sz="2000" dirty="0">
                 <a:latin typeface="Courier New" panose="02070309020205020404" pitchFamily="49" charset="0"/>
@@ -13027,13 +12993,6 @@
                 <a:cs typeface="Courier New" panose="02070309020205020404" pitchFamily="49" charset="0"/>
               </a:rPr>
               <a:t>;</a:t>
-            </a:r>
-            <a:r>
-              <a:rPr lang="en-US" sz="2000" dirty="0">
-                <a:latin typeface="Courier New" panose="02070309020205020404" pitchFamily="49" charset="0"/>
-                <a:cs typeface="Courier New" panose="02070309020205020404" pitchFamily="49" charset="0"/>
-              </a:rPr>
-              <a:t/>
             </a:r>
             <a:br>
               <a:rPr lang="en-US" sz="2000" dirty="0">
@@ -13925,16 +13884,6 @@
                 <a:spcPct val="0"/>
               </a:spcAft>
             </a:pPr>
-            <a:r>
-              <a:rPr lang="uk-UA" altLang="uk-UA" sz="2800" dirty="0">
-                <a:solidFill>
-                  <a:srgbClr val="000000"/>
-                </a:solidFill>
-                <a:latin typeface="Courier New" panose="02070309020205020404" pitchFamily="49" charset="0"/>
-                <a:cs typeface="Courier New" panose="02070309020205020404" pitchFamily="49" charset="0"/>
-              </a:rPr>
-              <a:t/>
-            </a:r>
             <a:br>
               <a:rPr lang="uk-UA" altLang="uk-UA" sz="2800" dirty="0">
                 <a:solidFill>
@@ -15384,20 +15333,6 @@
                 <a:cs typeface="Courier New" panose="02070309020205020404" pitchFamily="49" charset="0"/>
               </a:rPr>
             </a:br>
-            <a:r>
-              <a:rPr kumimoji="0" lang="uk-UA" altLang="uk-UA" b="0" i="0" u="none" strike="noStrike" cap="none" normalizeH="0" baseline="0" dirty="0">
-                <a:ln>
-                  <a:noFill/>
-                </a:ln>
-                <a:solidFill>
-                  <a:srgbClr val="000000"/>
-                </a:solidFill>
-                <a:effectLst/>
-                <a:latin typeface="Courier New" panose="02070309020205020404" pitchFamily="49" charset="0"/>
-                <a:cs typeface="Courier New" panose="02070309020205020404" pitchFamily="49" charset="0"/>
-              </a:rPr>
-              <a:t/>
-            </a:r>
             <a:br>
               <a:rPr kumimoji="0" lang="uk-UA" altLang="uk-UA" b="0" i="0" u="none" strike="noStrike" cap="none" normalizeH="0" baseline="0" dirty="0">
                 <a:ln>
@@ -15576,20 +15511,6 @@
                 <a:cs typeface="Courier New" panose="02070309020205020404" pitchFamily="49" charset="0"/>
               </a:rPr>
             </a:br>
-            <a:r>
-              <a:rPr kumimoji="0" lang="uk-UA" altLang="uk-UA" b="0" i="0" u="none" strike="noStrike" cap="none" normalizeH="0" baseline="0" dirty="0">
-                <a:ln>
-                  <a:noFill/>
-                </a:ln>
-                <a:solidFill>
-                  <a:srgbClr val="000000"/>
-                </a:solidFill>
-                <a:effectLst/>
-                <a:latin typeface="Courier New" panose="02070309020205020404" pitchFamily="49" charset="0"/>
-                <a:cs typeface="Courier New" panose="02070309020205020404" pitchFamily="49" charset="0"/>
-              </a:rPr>
-              <a:t/>
-            </a:r>
             <a:br>
               <a:rPr kumimoji="0" lang="uk-UA" altLang="uk-UA" b="0" i="0" u="none" strike="noStrike" cap="none" normalizeH="0" baseline="0" dirty="0">
                 <a:ln>
@@ -15768,20 +15689,6 @@
                 <a:cs typeface="Courier New" panose="02070309020205020404" pitchFamily="49" charset="0"/>
               </a:rPr>
             </a:br>
-            <a:r>
-              <a:rPr kumimoji="0" lang="uk-UA" altLang="uk-UA" b="0" i="0" u="none" strike="noStrike" cap="none" normalizeH="0" baseline="0" dirty="0">
-                <a:ln>
-                  <a:noFill/>
-                </a:ln>
-                <a:solidFill>
-                  <a:srgbClr val="000000"/>
-                </a:solidFill>
-                <a:effectLst/>
-                <a:latin typeface="Courier New" panose="02070309020205020404" pitchFamily="49" charset="0"/>
-                <a:cs typeface="Courier New" panose="02070309020205020404" pitchFamily="49" charset="0"/>
-              </a:rPr>
-              <a:t/>
-            </a:r>
             <a:br>
               <a:rPr kumimoji="0" lang="uk-UA" altLang="uk-UA" b="0" i="0" u="none" strike="noStrike" cap="none" normalizeH="0" baseline="0" dirty="0">
                 <a:ln>
@@ -16634,20 +16541,6 @@
                 <a:cs typeface="Courier New" panose="02070309020205020404" pitchFamily="49" charset="0"/>
               </a:rPr>
             </a:br>
-            <a:r>
-              <a:rPr kumimoji="0" lang="uk-UA" altLang="uk-UA" sz="2400" b="0" i="0" u="none" strike="noStrike" cap="none" normalizeH="0" baseline="0" dirty="0">
-                <a:ln>
-                  <a:noFill/>
-                </a:ln>
-                <a:solidFill>
-                  <a:srgbClr val="000000"/>
-                </a:solidFill>
-                <a:effectLst/>
-                <a:latin typeface="Courier New" panose="02070309020205020404" pitchFamily="49" charset="0"/>
-                <a:cs typeface="Courier New" panose="02070309020205020404" pitchFamily="49" charset="0"/>
-              </a:rPr>
-              <a:t/>
-            </a:r>
             <a:br>
               <a:rPr kumimoji="0" lang="uk-UA" altLang="uk-UA" sz="2400" b="0" i="0" u="none" strike="noStrike" cap="none" normalizeH="0" baseline="0" dirty="0">
                 <a:ln>
@@ -16661,20 +16554,6 @@
                 <a:cs typeface="Courier New" panose="02070309020205020404" pitchFamily="49" charset="0"/>
               </a:rPr>
             </a:br>
-            <a:r>
-              <a:rPr kumimoji="0" lang="uk-UA" altLang="uk-UA" sz="2400" b="0" i="0" u="none" strike="noStrike" cap="none" normalizeH="0" baseline="0" dirty="0">
-                <a:ln>
-                  <a:noFill/>
-                </a:ln>
-                <a:solidFill>
-                  <a:srgbClr val="000000"/>
-                </a:solidFill>
-                <a:effectLst/>
-                <a:latin typeface="Courier New" panose="02070309020205020404" pitchFamily="49" charset="0"/>
-                <a:cs typeface="Courier New" panose="02070309020205020404" pitchFamily="49" charset="0"/>
-              </a:rPr>
-              <a:t/>
-            </a:r>
             <a:br>
               <a:rPr kumimoji="0" lang="uk-UA" altLang="uk-UA" sz="2400" b="0" i="0" u="none" strike="noStrike" cap="none" normalizeH="0" baseline="0" dirty="0">
                 <a:ln>
@@ -17455,7 +17334,7 @@
               <a:t>i = </a:t>
             </a:r>
             <a:r>
-              <a:rPr lang="en-US" altLang="uk-UA" dirty="0" smtClean="0">
+              <a:rPr lang="en-US" altLang="uk-UA" dirty="0">
                 <a:solidFill>
                   <a:srgbClr val="0000FF"/>
                 </a:solidFill>
@@ -17465,16 +17344,6 @@
               <a:t>1</a:t>
             </a:r>
             <a:r>
-              <a:rPr lang="uk-UA" altLang="uk-UA" dirty="0" smtClean="0">
-                <a:solidFill>
-                  <a:srgbClr val="000000"/>
-                </a:solidFill>
-                <a:latin typeface="Courier New" panose="02070309020205020404" pitchFamily="49" charset="0"/>
-                <a:cs typeface="Courier New" panose="02070309020205020404" pitchFamily="49" charset="0"/>
-              </a:rPr>
-              <a:t>; </a:t>
-            </a:r>
-            <a:r>
               <a:rPr lang="uk-UA" altLang="uk-UA" dirty="0">
                 <a:solidFill>
                   <a:srgbClr val="000000"/>
@@ -17482,20 +17351,10 @@
                 <a:latin typeface="Courier New" panose="02070309020205020404" pitchFamily="49" charset="0"/>
                 <a:cs typeface="Courier New" panose="02070309020205020404" pitchFamily="49" charset="0"/>
               </a:rPr>
-              <a:t>i </a:t>
-            </a:r>
-            <a:r>
-              <a:rPr lang="uk-UA" altLang="uk-UA" dirty="0" smtClean="0">
-                <a:solidFill>
-                  <a:srgbClr val="000000"/>
-                </a:solidFill>
-                <a:latin typeface="Courier New" panose="02070309020205020404" pitchFamily="49" charset="0"/>
-                <a:cs typeface="Courier New" panose="02070309020205020404" pitchFamily="49" charset="0"/>
-              </a:rPr>
-              <a:t>&lt;</a:t>
-            </a:r>
-            <a:r>
-              <a:rPr lang="en-US" altLang="uk-UA" dirty="0" smtClean="0">
+              <a:t>; i &lt;</a:t>
+            </a:r>
+            <a:r>
+              <a:rPr lang="en-US" altLang="uk-UA" dirty="0">
                 <a:solidFill>
                   <a:srgbClr val="000000"/>
                 </a:solidFill>
@@ -17505,7 +17364,7 @@
               <a:t>=</a:t>
             </a:r>
             <a:r>
-              <a:rPr lang="uk-UA" altLang="uk-UA" dirty="0" smtClean="0">
+              <a:rPr lang="uk-UA" altLang="uk-UA" dirty="0">
                 <a:solidFill>
                   <a:srgbClr val="000000"/>
                 </a:solidFill>
@@ -17565,18 +17424,6 @@
                 </a:solidFill>
               </a:rPr>
               <a:t>Indexing start from 0</a:t>
-            </a:r>
-            <a:r>
-              <a:rPr lang="uk-UA" altLang="uk-UA" dirty="0">
-                <a:solidFill>
-                  <a:schemeClr val="bg2">
-                    <a:lumMod val="50000"/>
-                  </a:schemeClr>
-                </a:solidFill>
-                <a:latin typeface="Courier New" panose="02070309020205020404" pitchFamily="49" charset="0"/>
-                <a:cs typeface="Courier New" panose="02070309020205020404" pitchFamily="49" charset="0"/>
-              </a:rPr>
-              <a:t/>
             </a:r>
             <a:br>
               <a:rPr lang="uk-UA" altLang="uk-UA" dirty="0">
@@ -17655,16 +17502,6 @@
                 <a:spcPct val="0"/>
               </a:spcAft>
             </a:pPr>
-            <a:r>
-              <a:rPr lang="uk-UA" altLang="uk-UA" dirty="0">
-                <a:solidFill>
-                  <a:srgbClr val="000000"/>
-                </a:solidFill>
-                <a:latin typeface="Courier New" panose="02070309020205020404" pitchFamily="49" charset="0"/>
-                <a:cs typeface="Courier New" panose="02070309020205020404" pitchFamily="49" charset="0"/>
-              </a:rPr>
-              <a:t/>
-            </a:r>
             <a:br>
               <a:rPr lang="uk-UA" altLang="uk-UA" dirty="0">
                 <a:solidFill>
@@ -17835,18 +17672,6 @@
                 </a:solidFill>
               </a:rPr>
               <a:t>Can store multiple values inside</a:t>
-            </a:r>
-            <a:r>
-              <a:rPr lang="uk-UA" altLang="uk-UA" dirty="0">
-                <a:solidFill>
-                  <a:schemeClr val="bg2">
-                    <a:lumMod val="50000"/>
-                  </a:schemeClr>
-                </a:solidFill>
-                <a:latin typeface="Courier New" panose="02070309020205020404" pitchFamily="49" charset="0"/>
-                <a:cs typeface="Courier New" panose="02070309020205020404" pitchFamily="49" charset="0"/>
-              </a:rPr>
-              <a:t/>
             </a:r>
             <a:br>
               <a:rPr lang="uk-UA" altLang="uk-UA" dirty="0">
@@ -17878,16 +17703,6 @@
                 <a:spcPct val="0"/>
               </a:spcAft>
             </a:pPr>
-            <a:r>
-              <a:rPr lang="uk-UA" altLang="uk-UA" dirty="0">
-                <a:solidFill>
-                  <a:srgbClr val="000000"/>
-                </a:solidFill>
-                <a:latin typeface="Courier New" panose="02070309020205020404" pitchFamily="49" charset="0"/>
-                <a:cs typeface="Courier New" panose="02070309020205020404" pitchFamily="49" charset="0"/>
-              </a:rPr>
-              <a:t/>
-            </a:r>
             <a:br>
               <a:rPr lang="uk-UA" altLang="uk-UA" dirty="0">
                 <a:solidFill>
@@ -18032,16 +17847,6 @@
                 <a:spcPct val="0"/>
               </a:spcAft>
             </a:pPr>
-            <a:r>
-              <a:rPr lang="uk-UA" altLang="uk-UA" dirty="0">
-                <a:solidFill>
-                  <a:srgbClr val="000000"/>
-                </a:solidFill>
-                <a:latin typeface="Courier New" panose="02070309020205020404" pitchFamily="49" charset="0"/>
-                <a:cs typeface="Courier New" panose="02070309020205020404" pitchFamily="49" charset="0"/>
-              </a:rPr>
-              <a:t/>
-            </a:r>
             <a:br>
               <a:rPr lang="uk-UA" altLang="uk-UA" dirty="0">
                 <a:solidFill>
@@ -23901,16 +23706,6 @@
               </a:rPr>
               <a:t>statement;</a:t>
             </a:r>
-            <a:r>
-              <a:rPr lang="uk-UA" altLang="uk-UA" sz="2400" dirty="0">
-                <a:solidFill>
-                  <a:srgbClr val="000000"/>
-                </a:solidFill>
-                <a:latin typeface="Courier New" panose="02070309020205020404" pitchFamily="49" charset="0"/>
-                <a:cs typeface="Courier New" panose="02070309020205020404" pitchFamily="49" charset="0"/>
-              </a:rPr>
-              <a:t/>
-            </a:r>
             <a:br>
               <a:rPr lang="uk-UA" altLang="uk-UA" sz="2400" dirty="0">
                 <a:solidFill>
@@ -24660,16 +24455,6 @@
               </a:rPr>
               <a:t>statement;</a:t>
             </a:r>
-            <a:r>
-              <a:rPr lang="uk-UA" altLang="uk-UA" sz="2400" dirty="0">
-                <a:solidFill>
-                  <a:srgbClr val="000000"/>
-                </a:solidFill>
-                <a:latin typeface="Courier New" panose="02070309020205020404" pitchFamily="49" charset="0"/>
-                <a:cs typeface="Courier New" panose="02070309020205020404" pitchFamily="49" charset="0"/>
-              </a:rPr>
-              <a:t/>
-            </a:r>
             <a:br>
               <a:rPr lang="uk-UA" altLang="uk-UA" sz="2400" dirty="0">
                 <a:solidFill>
@@ -25754,16 +25539,6 @@
                 <a:cs typeface="Courier New" panose="02070309020205020404" pitchFamily="49" charset="0"/>
               </a:rPr>
             </a:br>
-            <a:r>
-              <a:rPr lang="uk-UA" altLang="uk-UA" sz="2400" i="1" dirty="0">
-                <a:solidFill>
-                  <a:srgbClr val="808080"/>
-                </a:solidFill>
-                <a:latin typeface="Courier New" panose="02070309020205020404" pitchFamily="49" charset="0"/>
-                <a:cs typeface="Courier New" panose="02070309020205020404" pitchFamily="49" charset="0"/>
-              </a:rPr>
-              <a:t/>
-            </a:r>
             <a:br>
               <a:rPr lang="uk-UA" altLang="uk-UA" sz="2400" i="1" dirty="0">
                 <a:solidFill>
@@ -25921,16 +25696,6 @@
                 <a:cs typeface="Courier New" panose="02070309020205020404" pitchFamily="49" charset="0"/>
               </a:rPr>
               <a:t>{</a:t>
-            </a:r>
-            <a:r>
-              <a:rPr lang="uk-UA" altLang="uk-UA" sz="2400" dirty="0">
-                <a:solidFill>
-                  <a:srgbClr val="000000"/>
-                </a:solidFill>
-                <a:latin typeface="Courier New" panose="02070309020205020404" pitchFamily="49" charset="0"/>
-                <a:cs typeface="Courier New" panose="02070309020205020404" pitchFamily="49" charset="0"/>
-              </a:rPr>
-              <a:t/>
             </a:r>
             <a:br>
               <a:rPr lang="uk-UA" altLang="uk-UA" sz="2400" dirty="0">
@@ -26048,16 +25813,6 @@
               </a:rPr>
               <a:t>	}</a:t>
             </a:r>
-            <a:r>
-              <a:rPr lang="uk-UA" altLang="uk-UA" sz="2400" dirty="0">
-                <a:solidFill>
-                  <a:srgbClr val="000000"/>
-                </a:solidFill>
-                <a:latin typeface="Courier New" panose="02070309020205020404" pitchFamily="49" charset="0"/>
-                <a:cs typeface="Courier New" panose="02070309020205020404" pitchFamily="49" charset="0"/>
-              </a:rPr>
-              <a:t/>
-            </a:r>
             <a:br>
               <a:rPr lang="uk-UA" altLang="uk-UA" sz="2400" dirty="0">
                 <a:solidFill>
@@ -26146,16 +25901,6 @@
                 <a:cs typeface="Courier New" panose="02070309020205020404" pitchFamily="49" charset="0"/>
               </a:rPr>
               <a:t>;</a:t>
-            </a:r>
-            <a:r>
-              <a:rPr lang="uk-UA" altLang="uk-UA" sz="2400" i="1" dirty="0">
-                <a:solidFill>
-                  <a:srgbClr val="808080"/>
-                </a:solidFill>
-                <a:latin typeface="Courier New" panose="02070309020205020404" pitchFamily="49" charset="0"/>
-                <a:cs typeface="Courier New" panose="02070309020205020404" pitchFamily="49" charset="0"/>
-              </a:rPr>
-              <a:t/>
             </a:r>
             <a:br>
               <a:rPr lang="uk-UA" altLang="uk-UA" sz="2400" i="1" dirty="0">
@@ -26796,16 +26541,6 @@
               </a:rPr>
               <a:t>	}</a:t>
             </a:r>
-            <a:r>
-              <a:rPr lang="uk-UA" altLang="uk-UA" sz="2400" dirty="0">
-                <a:solidFill>
-                  <a:srgbClr val="000000"/>
-                </a:solidFill>
-                <a:latin typeface="Courier New" panose="02070309020205020404" pitchFamily="49" charset="0"/>
-                <a:cs typeface="Courier New" panose="02070309020205020404" pitchFamily="49" charset="0"/>
-              </a:rPr>
-              <a:t/>
-            </a:r>
             <a:br>
               <a:rPr lang="uk-UA" altLang="uk-UA" sz="2400" dirty="0">
                 <a:solidFill>
@@ -26844,16 +26579,6 @@
                 <a:cs typeface="Courier New" panose="02070309020205020404" pitchFamily="49" charset="0"/>
               </a:rPr>
               <a:t>();</a:t>
-            </a:r>
-            <a:r>
-              <a:rPr lang="uk-UA" altLang="uk-UA" sz="2400" i="1" dirty="0">
-                <a:solidFill>
-                  <a:srgbClr val="808080"/>
-                </a:solidFill>
-                <a:latin typeface="Courier New" panose="02070309020205020404" pitchFamily="49" charset="0"/>
-                <a:cs typeface="Courier New" panose="02070309020205020404" pitchFamily="49" charset="0"/>
-              </a:rPr>
-              <a:t/>
             </a:r>
             <a:br>
               <a:rPr lang="uk-UA" altLang="uk-UA" sz="2400" i="1" dirty="0">
@@ -27547,16 +27272,6 @@
               </a:rPr>
               <a:t> {</a:t>
             </a:r>
-            <a:r>
-              <a:rPr lang="uk-UA" altLang="uk-UA" sz="2400" dirty="0">
-                <a:solidFill>
-                  <a:srgbClr val="000000"/>
-                </a:solidFill>
-                <a:latin typeface="Courier New" panose="02070309020205020404" pitchFamily="49" charset="0"/>
-                <a:cs typeface="Courier New" panose="02070309020205020404" pitchFamily="49" charset="0"/>
-              </a:rPr>
-              <a:t/>
-            </a:r>
             <a:br>
               <a:rPr lang="uk-UA" altLang="uk-UA" sz="2400" dirty="0">
                 <a:solidFill>
@@ -27663,16 +27378,6 @@
               </a:rPr>
               <a:t> and exit from method</a:t>
             </a:r>
-            <a:r>
-              <a:rPr lang="uk-UA" altLang="uk-UA" sz="2400" i="1" dirty="0">
-                <a:solidFill>
-                  <a:srgbClr val="808080"/>
-                </a:solidFill>
-                <a:latin typeface="Courier New" panose="02070309020205020404" pitchFamily="49" charset="0"/>
-                <a:cs typeface="Courier New" panose="02070309020205020404" pitchFamily="49" charset="0"/>
-              </a:rPr>
-              <a:t/>
-            </a:r>
             <a:br>
               <a:rPr lang="uk-UA" altLang="uk-UA" sz="2400" i="1" dirty="0">
                 <a:solidFill>
@@ -27701,10 +27406,6 @@
                 <a:cs typeface="Courier New" panose="02070309020205020404" pitchFamily="49" charset="0"/>
               </a:rPr>
               <a:t>}</a:t>
-            </a:r>
-            <a:r>
-              <a:rPr lang="uk-UA" altLang="uk-UA" dirty="0"/>
-              <a:t/>
             </a:r>
             <a:br>
               <a:rPr lang="uk-UA" altLang="uk-UA" dirty="0"/>
@@ -27748,16 +27449,6 @@
                 <a:cs typeface="Courier New" panose="02070309020205020404" pitchFamily="49" charset="0"/>
               </a:rPr>
               <a:t>();</a:t>
-            </a:r>
-            <a:r>
-              <a:rPr lang="uk-UA" altLang="uk-UA" sz="2400" i="1" dirty="0">
-                <a:solidFill>
-                  <a:srgbClr val="808080"/>
-                </a:solidFill>
-                <a:latin typeface="Courier New" panose="02070309020205020404" pitchFamily="49" charset="0"/>
-                <a:cs typeface="Courier New" panose="02070309020205020404" pitchFamily="49" charset="0"/>
-              </a:rPr>
-              <a:t/>
             </a:r>
             <a:br>
               <a:rPr lang="uk-UA" altLang="uk-UA" sz="2400" i="1" dirty="0">
@@ -29437,16 +29128,6 @@
                 <a:cs typeface="Courier New" panose="02070309020205020404" pitchFamily="49" charset="0"/>
               </a:rPr>
             </a:br>
-            <a:r>
-              <a:rPr lang="uk-UA" altLang="uk-UA" sz="2400" dirty="0">
-                <a:solidFill>
-                  <a:srgbClr val="000000"/>
-                </a:solidFill>
-                <a:latin typeface="Courier New" panose="02070309020205020404" pitchFamily="49" charset="0"/>
-                <a:cs typeface="Courier New" panose="02070309020205020404" pitchFamily="49" charset="0"/>
-              </a:rPr>
-              <a:t/>
-            </a:r>
             <a:br>
               <a:rPr lang="uk-UA" altLang="uk-UA" sz="2400" dirty="0">
                 <a:solidFill>
@@ -29456,16 +29137,6 @@
                 <a:cs typeface="Courier New" panose="02070309020205020404" pitchFamily="49" charset="0"/>
               </a:rPr>
             </a:br>
-            <a:r>
-              <a:rPr lang="uk-UA" altLang="uk-UA" sz="2400" dirty="0">
-                <a:solidFill>
-                  <a:srgbClr val="000000"/>
-                </a:solidFill>
-                <a:latin typeface="Courier New" panose="02070309020205020404" pitchFamily="49" charset="0"/>
-                <a:cs typeface="Courier New" panose="02070309020205020404" pitchFamily="49" charset="0"/>
-              </a:rPr>
-              <a:t/>
-            </a:r>
             <a:br>
               <a:rPr lang="uk-UA" altLang="uk-UA" sz="2400" dirty="0">
                 <a:solidFill>
@@ -29985,13 +29656,6 @@
               </a:rPr>
               <a:t>;</a:t>
             </a:r>
-            <a:r>
-              <a:rPr lang="en-US" sz="2400" dirty="0">
-                <a:latin typeface="+mn-ea"/>
-                <a:cs typeface="+mn-ea"/>
-              </a:rPr>
-              <a:t/>
-            </a:r>
             <a:br>
               <a:rPr lang="en-US" sz="2400" dirty="0">
                 <a:latin typeface="+mn-ea"/>
@@ -30037,13 +29701,6 @@
               </a:spcAft>
               <a:buNone/>
             </a:pPr>
-            <a:r>
-              <a:rPr lang="en-US" sz="2400" dirty="0">
-                <a:latin typeface="+mn-ea"/>
-                <a:cs typeface="+mn-ea"/>
-              </a:rPr>
-              <a:t/>
-            </a:r>
             <a:br>
               <a:rPr lang="en-US" sz="2400" dirty="0">
                 <a:latin typeface="+mn-ea"/>
@@ -30090,13 +29747,6 @@
               </a:rPr>
               <a:t> {</a:t>
             </a:r>
-            <a:r>
-              <a:rPr lang="en-US" sz="2400" dirty="0">
-                <a:latin typeface="+mn-ea"/>
-                <a:cs typeface="+mn-ea"/>
-              </a:rPr>
-              <a:t/>
-            </a:r>
             <a:br>
               <a:rPr lang="en-US" sz="2400" dirty="0">
                 <a:latin typeface="+mn-ea"/>
@@ -30123,13 +29773,6 @@
               </a:rPr>
               <a:t>// ...</a:t>
             </a:r>
-            <a:r>
-              <a:rPr lang="en-US" sz="2400" dirty="0">
-                <a:latin typeface="+mn-ea"/>
-                <a:cs typeface="+mn-ea"/>
-              </a:rPr>
-              <a:t/>
-            </a:r>
             <a:br>
               <a:rPr lang="en-US" sz="2400" dirty="0">
                 <a:latin typeface="+mn-ea"/>
@@ -30145,13 +29788,6 @@
                 <a:cs typeface="Courier New" panose="02070309020205020404" pitchFamily="49" charset="0"/>
               </a:rPr>
               <a:t>}</a:t>
-            </a:r>
-            <a:r>
-              <a:rPr lang="en-US" sz="2400" dirty="0">
-                <a:latin typeface="+mn-ea"/>
-                <a:cs typeface="+mn-ea"/>
-              </a:rPr>
-              <a:t/>
             </a:r>
             <a:br>
               <a:rPr lang="en-US" sz="2400" dirty="0">
@@ -32105,20 +31741,24 @@
             </a:r>
             <a:r>
               <a:rPr lang="fr-FR" sz="2000" i="1" u="sng" dirty="0"/>
-              <a:t>L01-T3 </a:t>
-            </a:r>
-            <a:r>
-              <a:rPr lang="fr-FR" sz="2000" i="1" u="sng" dirty="0" err="1"/>
-              <a:t>Implement</a:t>
-            </a:r>
-            <a:r>
-              <a:rPr lang="fr-FR" sz="2000" i="1" u="sng" dirty="0"/>
-              <a:t> unit tests</a:t>
+              <a:t>L01-T3 Implement unit tests</a:t>
             </a:r>
             <a:r>
               <a:rPr lang="en-US" sz="2000" dirty="0"/>
               <a:t>)</a:t>
             </a:r>
+          </a:p>
+          <a:p>
+            <a:r>
+              <a:rPr lang="en-US" sz="2000" dirty="0"/>
+              <a:t>Do not use collections framework in home tasks (only technologies covered by lecture)</a:t>
+            </a:r>
+            <a:endParaRPr lang="uk-UA" sz="2000"/>
+          </a:p>
+          <a:p>
+            <a:pPr marL="0" indent="0">
+              <a:buNone/>
+            </a:pPr>
             <a:endParaRPr lang="uk-UA" sz="2000" dirty="0"/>
           </a:p>
         </p:txBody>
@@ -32919,25 +32559,8 @@
           <a:p>
             <a:r>
               <a:rPr lang="en-US" sz="1400" b="1" dirty="0"/>
-              <a:t>cell[0,0] </a:t>
-            </a:r>
-            <a:r>
-              <a:rPr lang="en-US" sz="1400" b="1" dirty="0"/>
-              <a:t>has value </a:t>
-            </a:r>
-            <a:r>
-              <a:rPr lang="en-US" sz="1400" b="1" dirty="0" smtClean="0"/>
-              <a:t>1, </a:t>
-            </a:r>
-            <a:r>
-              <a:rPr lang="en-US" sz="1400" b="1" dirty="0"/>
-              <a:t>it’s root: </a:t>
-            </a:r>
-            <a:r>
-              <a:rPr lang="en-US" sz="1400" b="1" dirty="0" smtClean="0"/>
-              <a:t>1</a:t>
-            </a:r>
-            <a:endParaRPr lang="en-US" sz="1400" b="1" dirty="0"/>
+              <a:t>cell[0,0] has value 1, it’s root: 1</a:t>
+            </a:r>
           </a:p>
           <a:p>
             <a:r>

</xml_diff>